<commit_message>
update papers and presentations
</commit_message>
<xml_diff>
--- a/presentations/personal/Boston Python Meetup/2018/Everyone Friendly Graphs - ThePhD - 2018.pptx
+++ b/presentations/personal/Boston Python Meetup/2018/Everyone Friendly Graphs - ThePhD - 2018.pptx
@@ -247,7 +247,7 @@
           <a:p>
             <a:fld id="{FE5B4EDC-59C0-49C7-8ADA-5A781B329E02}" type="datetimeFigureOut">
               <a:rPr lang="en-US"/>
-              <a:t>10/17/2018</a:t>
+              <a:t>11/20/2018</a:t>
             </a:fld>
             <a:endParaRPr/>
           </a:p>
@@ -412,7 +412,7 @@
           <a:p>
             <a:fld id="{F2D8D46A-B586-417D-BFBD-8C8FE0AAF762}" type="datetimeFigureOut">
               <a:rPr lang="en-US"/>
-              <a:t>10/17/2018</a:t>
+              <a:t>11/20/2018</a:t>
             </a:fld>
             <a:endParaRPr/>
           </a:p>
@@ -1430,7 +1430,7 @@
           <a:p>
             <a:fld id="{3372BF89-6120-4841-BE25-477EFD510BB0}" type="datetime1">
               <a:rPr lang="en-US" smtClean="0"/>
-              <a:t>10/17/2018</a:t>
+              <a:t>11/20/2018</a:t>
             </a:fld>
             <a:endParaRPr/>
           </a:p>
@@ -1628,7 +1628,7 @@
           <a:p>
             <a:fld id="{E0CE2750-2022-4E98-A623-5E08F1008381}" type="datetime1">
               <a:rPr lang="en-US" smtClean="0"/>
-              <a:t>10/17/2018</a:t>
+              <a:t>11/20/2018</a:t>
             </a:fld>
             <a:endParaRPr/>
           </a:p>
@@ -1836,7 +1836,7 @@
           <a:p>
             <a:fld id="{ADF83501-2D04-4849-9817-965D31941C68}" type="datetime1">
               <a:rPr lang="en-US" smtClean="0"/>
-              <a:t>10/17/2018</a:t>
+              <a:t>11/20/2018</a:t>
             </a:fld>
             <a:endParaRPr/>
           </a:p>
@@ -2034,7 +2034,7 @@
           <a:p>
             <a:fld id="{DDDB5396-06DC-40F8-B0CB-16AA94C60308}" type="datetime1">
               <a:rPr lang="en-US" smtClean="0"/>
-              <a:t>10/17/2018</a:t>
+              <a:t>11/20/2018</a:t>
             </a:fld>
             <a:endParaRPr/>
           </a:p>
@@ -2466,7 +2466,7 @@
           <a:p>
             <a:fld id="{D97A6CE5-143D-4445-BB1B-578665AD0462}" type="datetime1">
               <a:rPr lang="en-US" smtClean="0"/>
-              <a:t>10/17/2018</a:t>
+              <a:t>11/20/2018</a:t>
             </a:fld>
             <a:endParaRPr/>
           </a:p>
@@ -2770,7 +2770,7 @@
           <a:p>
             <a:fld id="{57F760CA-3D69-4CC5-A843-7F11F1BC1407}" type="datetime1">
               <a:rPr lang="en-US" smtClean="0"/>
-              <a:t>10/17/2018</a:t>
+              <a:t>11/20/2018</a:t>
             </a:fld>
             <a:endParaRPr/>
           </a:p>
@@ -3226,7 +3226,7 @@
           <a:p>
             <a:fld id="{1292C6CE-CF3F-4590-B30E-9D44B9148633}" type="datetime1">
               <a:rPr lang="en-US" smtClean="0"/>
-              <a:t>10/17/2018</a:t>
+              <a:t>11/20/2018</a:t>
             </a:fld>
             <a:endParaRPr/>
           </a:p>
@@ -3356,7 +3356,7 @@
           <a:p>
             <a:fld id="{325BFD10-1A9A-4AF8-9FD3-7EE3D2A8E1CD}" type="datetime1">
               <a:rPr lang="en-US" smtClean="0"/>
-              <a:t>10/17/2018</a:t>
+              <a:t>11/20/2018</a:t>
             </a:fld>
             <a:endParaRPr/>
           </a:p>
@@ -3463,7 +3463,7 @@
           <a:p>
             <a:fld id="{8C74CA35-69A7-47F0-A9DA-EDDE87AE5B32}" type="datetime1">
               <a:rPr lang="en-US" smtClean="0"/>
-              <a:t>10/17/2018</a:t>
+              <a:t>11/20/2018</a:t>
             </a:fld>
             <a:endParaRPr/>
           </a:p>
@@ -3762,7 +3762,7 @@
           <a:p>
             <a:fld id="{778FC404-7204-4298-9910-B91005EC9036}" type="datetime1">
               <a:rPr lang="en-US" smtClean="0"/>
-              <a:t>10/17/2018</a:t>
+              <a:t>11/20/2018</a:t>
             </a:fld>
             <a:endParaRPr/>
           </a:p>
@@ -4050,7 +4050,7 @@
           <a:p>
             <a:fld id="{1F0A77E0-A0B8-4B84-A306-DC0C7016B62D}" type="datetime1">
               <a:rPr lang="en-US" smtClean="0"/>
-              <a:t>10/17/2018</a:t>
+              <a:t>11/20/2018</a:t>
             </a:fld>
             <a:endParaRPr/>
           </a:p>
@@ -4672,7 +4672,7 @@
           <a:p>
             <a:fld id="{981F7E67-73A2-45BC-A8E7-1DFBF641955E}" type="datetime1">
               <a:rPr lang="en-US" smtClean="0"/>
-              <a:t>10/17/2018</a:t>
+              <a:t>11/20/2018</a:t>
             </a:fld>
             <a:endParaRPr/>
           </a:p>
@@ -5220,8 +5220,8 @@
         </p:blipFill>
         <p:spPr>
           <a:xfrm>
-            <a:off x="10884506" y="5461312"/>
-            <a:ext cx="1162535" cy="1034215"/>
+            <a:off x="10960054" y="5501205"/>
+            <a:ext cx="925558" cy="823395"/>
           </a:xfrm>
           <a:prstGeom prst="rect">
             <a:avLst/>
@@ -5250,7 +5250,7 @@
         </p:blipFill>
         <p:spPr>
           <a:xfrm>
-            <a:off x="6856412" y="5334000"/>
+            <a:off x="4265612" y="4038600"/>
             <a:ext cx="717391" cy="537854"/>
           </a:xfrm>
           <a:prstGeom prst="rect">
@@ -5272,7 +5272,7 @@
         </p:nvSpPr>
         <p:spPr>
           <a:xfrm>
-            <a:off x="7573803" y="5404572"/>
+            <a:off x="4983003" y="4109172"/>
             <a:ext cx="3180520" cy="400110"/>
           </a:xfrm>
           <a:prstGeom prst="rect">
@@ -5347,7 +5347,7 @@
         </p:nvSpPr>
         <p:spPr>
           <a:xfrm>
-            <a:off x="6953579" y="6036826"/>
+            <a:off x="4362779" y="4741426"/>
             <a:ext cx="537854" cy="537854"/>
           </a:xfrm>
           <a:prstGeom prst="roundRect">
@@ -5399,8 +5399,8 @@
         </p:nvSpPr>
         <p:spPr>
           <a:xfrm>
-            <a:off x="7573404" y="6139877"/>
-            <a:ext cx="3810399" cy="400110"/>
+            <a:off x="4982604" y="4844477"/>
+            <a:ext cx="3180919" cy="400110"/>
           </a:xfrm>
           <a:prstGeom prst="rect">
             <a:avLst/>
@@ -5466,7 +5466,7 @@
         </p:blipFill>
         <p:spPr>
           <a:xfrm>
-            <a:off x="6967376" y="6076702"/>
+            <a:off x="4376576" y="4781302"/>
             <a:ext cx="504240" cy="473303"/>
           </a:xfrm>
           <a:prstGeom prst="rect">
@@ -5488,7 +5488,7 @@
         </p:nvSpPr>
         <p:spPr>
           <a:xfrm>
-            <a:off x="34916" y="6550223"/>
+            <a:off x="23117" y="5715000"/>
             <a:ext cx="3240096" cy="307777"/>
           </a:xfrm>
           <a:prstGeom prst="rect">
@@ -15762,6 +15762,151 @@
 </file>
 
 <file path=customXml/item1.xml><?xml version="1.0" encoding="utf-8"?>
+<?mso-contentType ?>
+<FormTemplates xmlns="http://schemas.microsoft.com/sharepoint/v3/contenttype/forms">
+  <Display>DocumentLibraryForm</Display>
+  <Edit>AssetEditForm</Edit>
+  <New>DocumentLibraryForm</New>
+</FormTemplates>
+</file>
+
+<file path=customXml/item2.xml><?xml version="1.0" encoding="utf-8"?>
+<p:properties xmlns:p="http://schemas.microsoft.com/office/2006/metadata/properties" xmlns:xsi="http://www.w3.org/2001/XMLSchema-instance" xmlns:pc="http://schemas.microsoft.com/office/infopath/2007/PartnerControls">
+  <documentManagement>
+    <LocPublishedLinkedAssetsLookup xmlns="4873beb7-5857-4685-be1f-d57550cc96cc" xsi:nil="true"/>
+    <ApprovalStatus xmlns="4873beb7-5857-4685-be1f-d57550cc96cc">InProgress</ApprovalStatus>
+    <MarketSpecific xmlns="4873beb7-5857-4685-be1f-d57550cc96cc">false</MarketSpecific>
+    <LocComments xmlns="4873beb7-5857-4685-be1f-d57550cc96cc" xsi:nil="true"/>
+    <LocLastLocAttemptVersionTypeLookup xmlns="4873beb7-5857-4685-be1f-d57550cc96cc" xsi:nil="true"/>
+    <DirectSourceMarket xmlns="4873beb7-5857-4685-be1f-d57550cc96cc" xsi:nil="true"/>
+    <ThumbnailAssetId xmlns="4873beb7-5857-4685-be1f-d57550cc96cc" xsi:nil="true"/>
+    <PrimaryImageGen xmlns="4873beb7-5857-4685-be1f-d57550cc96cc">false</PrimaryImageGen>
+    <LocNewPublishedVersionLookup xmlns="4873beb7-5857-4685-be1f-d57550cc96cc" xsi:nil="true"/>
+    <LegacyData xmlns="4873beb7-5857-4685-be1f-d57550cc96cc" xsi:nil="true"/>
+    <LocRecommendedHandoff xmlns="4873beb7-5857-4685-be1f-d57550cc96cc" xsi:nil="true"/>
+    <BusinessGroup xmlns="4873beb7-5857-4685-be1f-d57550cc96cc" xsi:nil="true"/>
+    <BlockPublish xmlns="4873beb7-5857-4685-be1f-d57550cc96cc">false</BlockPublish>
+    <TPFriendlyName xmlns="4873beb7-5857-4685-be1f-d57550cc96cc" xsi:nil="true"/>
+    <LocOverallPublishStatusLookup xmlns="4873beb7-5857-4685-be1f-d57550cc96cc" xsi:nil="true"/>
+    <NumericId xmlns="4873beb7-5857-4685-be1f-d57550cc96cc" xsi:nil="true"/>
+    <APEditor xmlns="4873beb7-5857-4685-be1f-d57550cc96cc">
+      <UserInfo>
+        <DisplayName/>
+        <AccountId xsi:nil="true"/>
+        <AccountType/>
+      </UserInfo>
+    </APEditor>
+    <SourceTitle xmlns="4873beb7-5857-4685-be1f-d57550cc96cc" xsi:nil="true"/>
+    <OpenTemplate xmlns="4873beb7-5857-4685-be1f-d57550cc96cc">true</OpenTemplate>
+    <LocOverallLocStatusLookup xmlns="4873beb7-5857-4685-be1f-d57550cc96cc" xsi:nil="true"/>
+    <UALocComments xmlns="4873beb7-5857-4685-be1f-d57550cc96cc" xsi:nil="true"/>
+    <ParentAssetId xmlns="4873beb7-5857-4685-be1f-d57550cc96cc" xsi:nil="true"/>
+    <IntlLangReviewDate xmlns="4873beb7-5857-4685-be1f-d57550cc96cc" xsi:nil="true"/>
+    <FeatureTagsTaxHTField0 xmlns="4873beb7-5857-4685-be1f-d57550cc96cc">
+      <Terms xmlns="http://schemas.microsoft.com/office/infopath/2007/PartnerControls"/>
+    </FeatureTagsTaxHTField0>
+    <PublishStatusLookup xmlns="4873beb7-5857-4685-be1f-d57550cc96cc">
+      <Value>1345093</Value>
+    </PublishStatusLookup>
+    <Providers xmlns="4873beb7-5857-4685-be1f-d57550cc96cc" xsi:nil="true"/>
+    <MachineTranslated xmlns="4873beb7-5857-4685-be1f-d57550cc96cc">false</MachineTranslated>
+    <OriginalSourceMarket xmlns="4873beb7-5857-4685-be1f-d57550cc96cc" xsi:nil="true"/>
+    <APDescription xmlns="4873beb7-5857-4685-be1f-d57550cc96cc">This simple template design works for technology and  businesses, but it's versatile enough to use in other contexts.  It features multiple slide layouts designed for widescreen (16x9 resolution) and includes a sample SmartArt list and chart that are easily editable.</APDescription>
+    <ClipArtFilename xmlns="4873beb7-5857-4685-be1f-d57550cc96cc" xsi:nil="true"/>
+    <ContentItem xmlns="4873beb7-5857-4685-be1f-d57550cc96cc" xsi:nil="true"/>
+    <TPInstallLocation xmlns="4873beb7-5857-4685-be1f-d57550cc96cc" xsi:nil="true"/>
+    <PublishTargets xmlns="4873beb7-5857-4685-be1f-d57550cc96cc">OfficeOnlineVNext</PublishTargets>
+    <TimesCloned xmlns="4873beb7-5857-4685-be1f-d57550cc96cc" xsi:nil="true"/>
+    <AssetStart xmlns="4873beb7-5857-4685-be1f-d57550cc96cc">2011-11-26T00:30:00+00:00</AssetStart>
+    <Provider xmlns="4873beb7-5857-4685-be1f-d57550cc96cc" xsi:nil="true"/>
+    <AcquiredFrom xmlns="4873beb7-5857-4685-be1f-d57550cc96cc">Internal MS</AcquiredFrom>
+    <FriendlyTitle xmlns="4873beb7-5857-4685-be1f-d57550cc96cc" xsi:nil="true"/>
+    <LastHandOff xmlns="4873beb7-5857-4685-be1f-d57550cc96cc" xsi:nil="true"/>
+    <TPClientViewer xmlns="4873beb7-5857-4685-be1f-d57550cc96cc" xsi:nil="true"/>
+    <TemplateStatus xmlns="4873beb7-5857-4685-be1f-d57550cc96cc">Complete</TemplateStatus>
+    <Downloads xmlns="4873beb7-5857-4685-be1f-d57550cc96cc">0</Downloads>
+    <OOCacheId xmlns="4873beb7-5857-4685-be1f-d57550cc96cc" xsi:nil="true"/>
+    <IsDeleted xmlns="4873beb7-5857-4685-be1f-d57550cc96cc">false</IsDeleted>
+    <LocPublishedDependentAssetsLookup xmlns="4873beb7-5857-4685-be1f-d57550cc96cc" xsi:nil="true"/>
+    <TPExecutable xmlns="4873beb7-5857-4685-be1f-d57550cc96cc" xsi:nil="true"/>
+    <EditorialTags xmlns="4873beb7-5857-4685-be1f-d57550cc96cc" xsi:nil="true"/>
+    <SubmitterId xmlns="4873beb7-5857-4685-be1f-d57550cc96cc" xsi:nil="true"/>
+    <ApprovalLog xmlns="4873beb7-5857-4685-be1f-d57550cc96cc" xsi:nil="true"/>
+    <AssetType xmlns="4873beb7-5857-4685-be1f-d57550cc96cc">TP</AssetType>
+    <BugNumber xmlns="4873beb7-5857-4685-be1f-d57550cc96cc" xsi:nil="true"/>
+    <CSXSubmissionDate xmlns="4873beb7-5857-4685-be1f-d57550cc96cc" xsi:nil="true"/>
+    <CSXUpdate xmlns="4873beb7-5857-4685-be1f-d57550cc96cc">false</CSXUpdate>
+    <Milestone xmlns="4873beb7-5857-4685-be1f-d57550cc96cc" xsi:nil="true"/>
+    <RecommendationsModifier xmlns="4873beb7-5857-4685-be1f-d57550cc96cc" xsi:nil="true"/>
+    <OriginAsset xmlns="4873beb7-5857-4685-be1f-d57550cc96cc" xsi:nil="true"/>
+    <TPComponent xmlns="4873beb7-5857-4685-be1f-d57550cc96cc" xsi:nil="true"/>
+    <AssetId xmlns="4873beb7-5857-4685-be1f-d57550cc96cc">TP102787989</AssetId>
+    <IntlLocPriority xmlns="4873beb7-5857-4685-be1f-d57550cc96cc" xsi:nil="true"/>
+    <PolicheckWords xmlns="4873beb7-5857-4685-be1f-d57550cc96cc" xsi:nil="true"/>
+    <TPLaunchHelpLink xmlns="4873beb7-5857-4685-be1f-d57550cc96cc" xsi:nil="true"/>
+    <TPApplication xmlns="4873beb7-5857-4685-be1f-d57550cc96cc" xsi:nil="true"/>
+    <CrawlForDependencies xmlns="4873beb7-5857-4685-be1f-d57550cc96cc">false</CrawlForDependencies>
+    <HandoffToMSDN xmlns="4873beb7-5857-4685-be1f-d57550cc96cc" xsi:nil="true"/>
+    <PlannedPubDate xmlns="4873beb7-5857-4685-be1f-d57550cc96cc" xsi:nil="true"/>
+    <IntlLangReviewer xmlns="4873beb7-5857-4685-be1f-d57550cc96cc" xsi:nil="true"/>
+    <TrustLevel xmlns="4873beb7-5857-4685-be1f-d57550cc96cc">1 Microsoft Managed Content</TrustLevel>
+    <LocLastLocAttemptVersionLookup xmlns="4873beb7-5857-4685-be1f-d57550cc96cc">694266</LocLastLocAttemptVersionLookup>
+    <LocProcessedForHandoffsLookup xmlns="4873beb7-5857-4685-be1f-d57550cc96cc" xsi:nil="true"/>
+    <IsSearchable xmlns="4873beb7-5857-4685-be1f-d57550cc96cc">true</IsSearchable>
+    <TemplateTemplateType xmlns="4873beb7-5857-4685-be1f-d57550cc96cc">PowerPoint Presentation Template</TemplateTemplateType>
+    <CampaignTagsTaxHTField0 xmlns="4873beb7-5857-4685-be1f-d57550cc96cc">
+      <Terms xmlns="http://schemas.microsoft.com/office/infopath/2007/PartnerControls"/>
+    </CampaignTagsTaxHTField0>
+    <TPNamespace xmlns="4873beb7-5857-4685-be1f-d57550cc96cc" xsi:nil="true"/>
+    <LocOverallPreviewStatusLookup xmlns="4873beb7-5857-4685-be1f-d57550cc96cc" xsi:nil="true"/>
+    <TaxCatchAll xmlns="4873beb7-5857-4685-be1f-d57550cc96cc"/>
+    <Markets xmlns="4873beb7-5857-4685-be1f-d57550cc96cc"/>
+    <UAProjectedTotalWords xmlns="4873beb7-5857-4685-be1f-d57550cc96cc" xsi:nil="true"/>
+    <IntlLangReview xmlns="4873beb7-5857-4685-be1f-d57550cc96cc" xsi:nil="true"/>
+    <OutputCachingOn xmlns="4873beb7-5857-4685-be1f-d57550cc96cc">false</OutputCachingOn>
+    <AverageRating xmlns="4873beb7-5857-4685-be1f-d57550cc96cc" xsi:nil="true"/>
+    <APAuthor xmlns="4873beb7-5857-4685-be1f-d57550cc96cc">
+      <UserInfo>
+        <DisplayName>REDMOND\kristaa</DisplayName>
+        <AccountId>136</AccountId>
+        <AccountType/>
+      </UserInfo>
+    </APAuthor>
+    <LocManualTestRequired xmlns="4873beb7-5857-4685-be1f-d57550cc96cc">false</LocManualTestRequired>
+    <TPCommandLine xmlns="4873beb7-5857-4685-be1f-d57550cc96cc" xsi:nil="true"/>
+    <TPAppVersion xmlns="4873beb7-5857-4685-be1f-d57550cc96cc" xsi:nil="true"/>
+    <EditorialStatus xmlns="4873beb7-5857-4685-be1f-d57550cc96cc">Complete</EditorialStatus>
+    <LastModifiedDateTime xmlns="4873beb7-5857-4685-be1f-d57550cc96cc" xsi:nil="true"/>
+    <ScenarioTagsTaxHTField0 xmlns="4873beb7-5857-4685-be1f-d57550cc96cc">
+      <Terms xmlns="http://schemas.microsoft.com/office/infopath/2007/PartnerControls"/>
+    </ScenarioTagsTaxHTField0>
+    <LocProcessedForMarketsLookup xmlns="4873beb7-5857-4685-be1f-d57550cc96cc" xsi:nil="true"/>
+    <TPLaunchHelpLinkType xmlns="4873beb7-5857-4685-be1f-d57550cc96cc">Template</TPLaunchHelpLinkType>
+    <OriginalRelease xmlns="4873beb7-5857-4685-be1f-d57550cc96cc">15</OriginalRelease>
+    <LocalizationTagsTaxHTField0 xmlns="4873beb7-5857-4685-be1f-d57550cc96cc">
+      <Terms xmlns="http://schemas.microsoft.com/office/infopath/2007/PartnerControls"/>
+    </LocalizationTagsTaxHTField0>
+    <UACurrentWords xmlns="4873beb7-5857-4685-be1f-d57550cc96cc" xsi:nil="true"/>
+    <ArtSampleDocs xmlns="4873beb7-5857-4685-be1f-d57550cc96cc" xsi:nil="true"/>
+    <UALocRecommendation xmlns="4873beb7-5857-4685-be1f-d57550cc96cc">Localize</UALocRecommendation>
+    <Manager xmlns="4873beb7-5857-4685-be1f-d57550cc96cc" xsi:nil="true"/>
+    <LocOverallHandbackStatusLookup xmlns="4873beb7-5857-4685-be1f-d57550cc96cc" xsi:nil="true"/>
+    <ShowIn xmlns="4873beb7-5857-4685-be1f-d57550cc96cc">Show everywhere</ShowIn>
+    <UANotes xmlns="4873beb7-5857-4685-be1f-d57550cc96cc" xsi:nil="true"/>
+    <InternalTagsTaxHTField0 xmlns="4873beb7-5857-4685-be1f-d57550cc96cc">
+      <Terms xmlns="http://schemas.microsoft.com/office/infopath/2007/PartnerControls"/>
+    </InternalTagsTaxHTField0>
+    <CSXHash xmlns="4873beb7-5857-4685-be1f-d57550cc96cc" xsi:nil="true"/>
+    <VoteCount xmlns="4873beb7-5857-4685-be1f-d57550cc96cc" xsi:nil="true"/>
+    <AssetExpire xmlns="4873beb7-5857-4685-be1f-d57550cc96cc">2029-05-12T07:00:00+00:00</AssetExpire>
+    <DSATActionTaken xmlns="4873beb7-5857-4685-be1f-d57550cc96cc" xsi:nil="true"/>
+    <CSXSubmissionMarket xmlns="4873beb7-5857-4685-be1f-d57550cc96cc" xsi:nil="true"/>
+    <LocMarketGroupTiers2 xmlns="4873beb7-5857-4685-be1f-d57550cc96cc" xsi:nil="true"/>
+  </documentManagement>
+</p:properties>
+</file>
+
+<file path=customXml/item3.xml><?xml version="1.0" encoding="utf-8"?>
 <ct:contentTypeSchema xmlns:ct="http://schemas.microsoft.com/office/2006/metadata/contentType" xmlns:ma="http://schemas.microsoft.com/office/2006/metadata/properties/metaAttributes" ct:_="" ma:_="" ma:contentTypeName="TemplateFile" ma:contentTypeID="0x0101006EDDDB5EE6D98C44930B742096920B300400F5B6D36B3EF94B4E9A635CDF2A18F5B8" ma:contentTypeVersion="72" ma:contentTypeDescription="Create a new document." ma:contentTypeScope="" ma:versionID="a23e56308344d904b51738559c3d67c9">
   <xsd:schema xmlns:xsd="http://www.w3.org/2001/XMLSchema" xmlns:xs="http://www.w3.org/2001/XMLSchema" xmlns:p="http://schemas.microsoft.com/office/2006/metadata/properties" xmlns:ns2="4873beb7-5857-4685-be1f-d57550cc96cc" targetNamespace="http://schemas.microsoft.com/office/2006/metadata/properties" ma:root="true" ma:fieldsID="cd0908cc4600e77bf5da051303e00c8d" ns2:_="">
     <xsd:import namespace="4873beb7-5857-4685-be1f-d57550cc96cc"/>
@@ -16801,165 +16946,10 @@
 </ct:contentTypeSchema>
 </file>
 
-<file path=customXml/item2.xml><?xml version="1.0" encoding="utf-8"?>
-<p:properties xmlns:p="http://schemas.microsoft.com/office/2006/metadata/properties" xmlns:xsi="http://www.w3.org/2001/XMLSchema-instance" xmlns:pc="http://schemas.microsoft.com/office/infopath/2007/PartnerControls">
-  <documentManagement>
-    <LocPublishedLinkedAssetsLookup xmlns="4873beb7-5857-4685-be1f-d57550cc96cc" xsi:nil="true"/>
-    <ApprovalStatus xmlns="4873beb7-5857-4685-be1f-d57550cc96cc">InProgress</ApprovalStatus>
-    <MarketSpecific xmlns="4873beb7-5857-4685-be1f-d57550cc96cc">false</MarketSpecific>
-    <LocComments xmlns="4873beb7-5857-4685-be1f-d57550cc96cc" xsi:nil="true"/>
-    <LocLastLocAttemptVersionTypeLookup xmlns="4873beb7-5857-4685-be1f-d57550cc96cc" xsi:nil="true"/>
-    <DirectSourceMarket xmlns="4873beb7-5857-4685-be1f-d57550cc96cc" xsi:nil="true"/>
-    <ThumbnailAssetId xmlns="4873beb7-5857-4685-be1f-d57550cc96cc" xsi:nil="true"/>
-    <PrimaryImageGen xmlns="4873beb7-5857-4685-be1f-d57550cc96cc">false</PrimaryImageGen>
-    <LocNewPublishedVersionLookup xmlns="4873beb7-5857-4685-be1f-d57550cc96cc" xsi:nil="true"/>
-    <LegacyData xmlns="4873beb7-5857-4685-be1f-d57550cc96cc" xsi:nil="true"/>
-    <LocRecommendedHandoff xmlns="4873beb7-5857-4685-be1f-d57550cc96cc" xsi:nil="true"/>
-    <BusinessGroup xmlns="4873beb7-5857-4685-be1f-d57550cc96cc" xsi:nil="true"/>
-    <BlockPublish xmlns="4873beb7-5857-4685-be1f-d57550cc96cc">false</BlockPublish>
-    <TPFriendlyName xmlns="4873beb7-5857-4685-be1f-d57550cc96cc" xsi:nil="true"/>
-    <LocOverallPublishStatusLookup xmlns="4873beb7-5857-4685-be1f-d57550cc96cc" xsi:nil="true"/>
-    <NumericId xmlns="4873beb7-5857-4685-be1f-d57550cc96cc" xsi:nil="true"/>
-    <APEditor xmlns="4873beb7-5857-4685-be1f-d57550cc96cc">
-      <UserInfo>
-        <DisplayName/>
-        <AccountId xsi:nil="true"/>
-        <AccountType/>
-      </UserInfo>
-    </APEditor>
-    <SourceTitle xmlns="4873beb7-5857-4685-be1f-d57550cc96cc" xsi:nil="true"/>
-    <OpenTemplate xmlns="4873beb7-5857-4685-be1f-d57550cc96cc">true</OpenTemplate>
-    <LocOverallLocStatusLookup xmlns="4873beb7-5857-4685-be1f-d57550cc96cc" xsi:nil="true"/>
-    <UALocComments xmlns="4873beb7-5857-4685-be1f-d57550cc96cc" xsi:nil="true"/>
-    <ParentAssetId xmlns="4873beb7-5857-4685-be1f-d57550cc96cc" xsi:nil="true"/>
-    <IntlLangReviewDate xmlns="4873beb7-5857-4685-be1f-d57550cc96cc" xsi:nil="true"/>
-    <FeatureTagsTaxHTField0 xmlns="4873beb7-5857-4685-be1f-d57550cc96cc">
-      <Terms xmlns="http://schemas.microsoft.com/office/infopath/2007/PartnerControls"/>
-    </FeatureTagsTaxHTField0>
-    <PublishStatusLookup xmlns="4873beb7-5857-4685-be1f-d57550cc96cc">
-      <Value>1345093</Value>
-    </PublishStatusLookup>
-    <Providers xmlns="4873beb7-5857-4685-be1f-d57550cc96cc" xsi:nil="true"/>
-    <MachineTranslated xmlns="4873beb7-5857-4685-be1f-d57550cc96cc">false</MachineTranslated>
-    <OriginalSourceMarket xmlns="4873beb7-5857-4685-be1f-d57550cc96cc" xsi:nil="true"/>
-    <APDescription xmlns="4873beb7-5857-4685-be1f-d57550cc96cc">This simple template design works for technology and  businesses, but it's versatile enough to use in other contexts.  It features multiple slide layouts designed for widescreen (16x9 resolution) and includes a sample SmartArt list and chart that are easily editable.</APDescription>
-    <ClipArtFilename xmlns="4873beb7-5857-4685-be1f-d57550cc96cc" xsi:nil="true"/>
-    <ContentItem xmlns="4873beb7-5857-4685-be1f-d57550cc96cc" xsi:nil="true"/>
-    <TPInstallLocation xmlns="4873beb7-5857-4685-be1f-d57550cc96cc" xsi:nil="true"/>
-    <PublishTargets xmlns="4873beb7-5857-4685-be1f-d57550cc96cc">OfficeOnlineVNext</PublishTargets>
-    <TimesCloned xmlns="4873beb7-5857-4685-be1f-d57550cc96cc" xsi:nil="true"/>
-    <AssetStart xmlns="4873beb7-5857-4685-be1f-d57550cc96cc">2011-11-26T00:30:00+00:00</AssetStart>
-    <Provider xmlns="4873beb7-5857-4685-be1f-d57550cc96cc" xsi:nil="true"/>
-    <AcquiredFrom xmlns="4873beb7-5857-4685-be1f-d57550cc96cc">Internal MS</AcquiredFrom>
-    <FriendlyTitle xmlns="4873beb7-5857-4685-be1f-d57550cc96cc" xsi:nil="true"/>
-    <LastHandOff xmlns="4873beb7-5857-4685-be1f-d57550cc96cc" xsi:nil="true"/>
-    <TPClientViewer xmlns="4873beb7-5857-4685-be1f-d57550cc96cc" xsi:nil="true"/>
-    <TemplateStatus xmlns="4873beb7-5857-4685-be1f-d57550cc96cc">Complete</TemplateStatus>
-    <Downloads xmlns="4873beb7-5857-4685-be1f-d57550cc96cc">0</Downloads>
-    <OOCacheId xmlns="4873beb7-5857-4685-be1f-d57550cc96cc" xsi:nil="true"/>
-    <IsDeleted xmlns="4873beb7-5857-4685-be1f-d57550cc96cc">false</IsDeleted>
-    <LocPublishedDependentAssetsLookup xmlns="4873beb7-5857-4685-be1f-d57550cc96cc" xsi:nil="true"/>
-    <TPExecutable xmlns="4873beb7-5857-4685-be1f-d57550cc96cc" xsi:nil="true"/>
-    <EditorialTags xmlns="4873beb7-5857-4685-be1f-d57550cc96cc" xsi:nil="true"/>
-    <SubmitterId xmlns="4873beb7-5857-4685-be1f-d57550cc96cc" xsi:nil="true"/>
-    <ApprovalLog xmlns="4873beb7-5857-4685-be1f-d57550cc96cc" xsi:nil="true"/>
-    <AssetType xmlns="4873beb7-5857-4685-be1f-d57550cc96cc">TP</AssetType>
-    <BugNumber xmlns="4873beb7-5857-4685-be1f-d57550cc96cc" xsi:nil="true"/>
-    <CSXSubmissionDate xmlns="4873beb7-5857-4685-be1f-d57550cc96cc" xsi:nil="true"/>
-    <CSXUpdate xmlns="4873beb7-5857-4685-be1f-d57550cc96cc">false</CSXUpdate>
-    <Milestone xmlns="4873beb7-5857-4685-be1f-d57550cc96cc" xsi:nil="true"/>
-    <RecommendationsModifier xmlns="4873beb7-5857-4685-be1f-d57550cc96cc" xsi:nil="true"/>
-    <OriginAsset xmlns="4873beb7-5857-4685-be1f-d57550cc96cc" xsi:nil="true"/>
-    <TPComponent xmlns="4873beb7-5857-4685-be1f-d57550cc96cc" xsi:nil="true"/>
-    <AssetId xmlns="4873beb7-5857-4685-be1f-d57550cc96cc">TP102787989</AssetId>
-    <IntlLocPriority xmlns="4873beb7-5857-4685-be1f-d57550cc96cc" xsi:nil="true"/>
-    <PolicheckWords xmlns="4873beb7-5857-4685-be1f-d57550cc96cc" xsi:nil="true"/>
-    <TPLaunchHelpLink xmlns="4873beb7-5857-4685-be1f-d57550cc96cc" xsi:nil="true"/>
-    <TPApplication xmlns="4873beb7-5857-4685-be1f-d57550cc96cc" xsi:nil="true"/>
-    <CrawlForDependencies xmlns="4873beb7-5857-4685-be1f-d57550cc96cc">false</CrawlForDependencies>
-    <HandoffToMSDN xmlns="4873beb7-5857-4685-be1f-d57550cc96cc" xsi:nil="true"/>
-    <PlannedPubDate xmlns="4873beb7-5857-4685-be1f-d57550cc96cc" xsi:nil="true"/>
-    <IntlLangReviewer xmlns="4873beb7-5857-4685-be1f-d57550cc96cc" xsi:nil="true"/>
-    <TrustLevel xmlns="4873beb7-5857-4685-be1f-d57550cc96cc">1 Microsoft Managed Content</TrustLevel>
-    <LocLastLocAttemptVersionLookup xmlns="4873beb7-5857-4685-be1f-d57550cc96cc">694266</LocLastLocAttemptVersionLookup>
-    <LocProcessedForHandoffsLookup xmlns="4873beb7-5857-4685-be1f-d57550cc96cc" xsi:nil="true"/>
-    <IsSearchable xmlns="4873beb7-5857-4685-be1f-d57550cc96cc">true</IsSearchable>
-    <TemplateTemplateType xmlns="4873beb7-5857-4685-be1f-d57550cc96cc">PowerPoint Presentation Template</TemplateTemplateType>
-    <CampaignTagsTaxHTField0 xmlns="4873beb7-5857-4685-be1f-d57550cc96cc">
-      <Terms xmlns="http://schemas.microsoft.com/office/infopath/2007/PartnerControls"/>
-    </CampaignTagsTaxHTField0>
-    <TPNamespace xmlns="4873beb7-5857-4685-be1f-d57550cc96cc" xsi:nil="true"/>
-    <LocOverallPreviewStatusLookup xmlns="4873beb7-5857-4685-be1f-d57550cc96cc" xsi:nil="true"/>
-    <TaxCatchAll xmlns="4873beb7-5857-4685-be1f-d57550cc96cc"/>
-    <Markets xmlns="4873beb7-5857-4685-be1f-d57550cc96cc"/>
-    <UAProjectedTotalWords xmlns="4873beb7-5857-4685-be1f-d57550cc96cc" xsi:nil="true"/>
-    <IntlLangReview xmlns="4873beb7-5857-4685-be1f-d57550cc96cc" xsi:nil="true"/>
-    <OutputCachingOn xmlns="4873beb7-5857-4685-be1f-d57550cc96cc">false</OutputCachingOn>
-    <AverageRating xmlns="4873beb7-5857-4685-be1f-d57550cc96cc" xsi:nil="true"/>
-    <APAuthor xmlns="4873beb7-5857-4685-be1f-d57550cc96cc">
-      <UserInfo>
-        <DisplayName>REDMOND\kristaa</DisplayName>
-        <AccountId>136</AccountId>
-        <AccountType/>
-      </UserInfo>
-    </APAuthor>
-    <LocManualTestRequired xmlns="4873beb7-5857-4685-be1f-d57550cc96cc">false</LocManualTestRequired>
-    <TPCommandLine xmlns="4873beb7-5857-4685-be1f-d57550cc96cc" xsi:nil="true"/>
-    <TPAppVersion xmlns="4873beb7-5857-4685-be1f-d57550cc96cc" xsi:nil="true"/>
-    <EditorialStatus xmlns="4873beb7-5857-4685-be1f-d57550cc96cc">Complete</EditorialStatus>
-    <LastModifiedDateTime xmlns="4873beb7-5857-4685-be1f-d57550cc96cc" xsi:nil="true"/>
-    <ScenarioTagsTaxHTField0 xmlns="4873beb7-5857-4685-be1f-d57550cc96cc">
-      <Terms xmlns="http://schemas.microsoft.com/office/infopath/2007/PartnerControls"/>
-    </ScenarioTagsTaxHTField0>
-    <LocProcessedForMarketsLookup xmlns="4873beb7-5857-4685-be1f-d57550cc96cc" xsi:nil="true"/>
-    <TPLaunchHelpLinkType xmlns="4873beb7-5857-4685-be1f-d57550cc96cc">Template</TPLaunchHelpLinkType>
-    <OriginalRelease xmlns="4873beb7-5857-4685-be1f-d57550cc96cc">15</OriginalRelease>
-    <LocalizationTagsTaxHTField0 xmlns="4873beb7-5857-4685-be1f-d57550cc96cc">
-      <Terms xmlns="http://schemas.microsoft.com/office/infopath/2007/PartnerControls"/>
-    </LocalizationTagsTaxHTField0>
-    <UACurrentWords xmlns="4873beb7-5857-4685-be1f-d57550cc96cc" xsi:nil="true"/>
-    <ArtSampleDocs xmlns="4873beb7-5857-4685-be1f-d57550cc96cc" xsi:nil="true"/>
-    <UALocRecommendation xmlns="4873beb7-5857-4685-be1f-d57550cc96cc">Localize</UALocRecommendation>
-    <Manager xmlns="4873beb7-5857-4685-be1f-d57550cc96cc" xsi:nil="true"/>
-    <LocOverallHandbackStatusLookup xmlns="4873beb7-5857-4685-be1f-d57550cc96cc" xsi:nil="true"/>
-    <ShowIn xmlns="4873beb7-5857-4685-be1f-d57550cc96cc">Show everywhere</ShowIn>
-    <UANotes xmlns="4873beb7-5857-4685-be1f-d57550cc96cc" xsi:nil="true"/>
-    <InternalTagsTaxHTField0 xmlns="4873beb7-5857-4685-be1f-d57550cc96cc">
-      <Terms xmlns="http://schemas.microsoft.com/office/infopath/2007/PartnerControls"/>
-    </InternalTagsTaxHTField0>
-    <CSXHash xmlns="4873beb7-5857-4685-be1f-d57550cc96cc" xsi:nil="true"/>
-    <VoteCount xmlns="4873beb7-5857-4685-be1f-d57550cc96cc" xsi:nil="true"/>
-    <AssetExpire xmlns="4873beb7-5857-4685-be1f-d57550cc96cc">2029-05-12T07:00:00+00:00</AssetExpire>
-    <DSATActionTaken xmlns="4873beb7-5857-4685-be1f-d57550cc96cc" xsi:nil="true"/>
-    <CSXSubmissionMarket xmlns="4873beb7-5857-4685-be1f-d57550cc96cc" xsi:nil="true"/>
-    <LocMarketGroupTiers2 xmlns="4873beb7-5857-4685-be1f-d57550cc96cc" xsi:nil="true"/>
-  </documentManagement>
-</p:properties>
-</file>
-
-<file path=customXml/item3.xml><?xml version="1.0" encoding="utf-8"?>
-<?mso-contentType ?>
-<FormTemplates xmlns="http://schemas.microsoft.com/sharepoint/v3/contenttype/forms">
-  <Display>DocumentLibraryForm</Display>
-  <Edit>AssetEditForm</Edit>
-  <New>DocumentLibraryForm</New>
-</FormTemplates>
-</file>
-
 <file path=customXml/itemProps1.xml><?xml version="1.0" encoding="utf-8"?>
-<ds:datastoreItem xmlns:ds="http://schemas.openxmlformats.org/officeDocument/2006/customXml" ds:itemID="{A09BF4D4-EF60-4196-BFC3-9462D607978C}">
+<ds:datastoreItem xmlns:ds="http://schemas.openxmlformats.org/officeDocument/2006/customXml" ds:itemID="{3836F65B-1B07-41EE-A0E8-BC6EF3855225}">
   <ds:schemaRefs>
-    <ds:schemaRef ds:uri="http://schemas.microsoft.com/office/2006/metadata/contentType"/>
-    <ds:schemaRef ds:uri="http://schemas.microsoft.com/office/2006/metadata/properties/metaAttributes"/>
-    <ds:schemaRef ds:uri="http://www.w3.org/2001/XMLSchema"/>
-    <ds:schemaRef ds:uri="http://schemas.microsoft.com/office/2006/metadata/properties"/>
-    <ds:schemaRef ds:uri="4873beb7-5857-4685-be1f-d57550cc96cc"/>
-    <ds:schemaRef ds:uri="http://schemas.microsoft.com/office/2006/documentManagement/types"/>
-    <ds:schemaRef ds:uri="http://schemas.microsoft.com/office/infopath/2007/PartnerControls"/>
-    <ds:schemaRef ds:uri="http://schemas.openxmlformats.org/package/2006/metadata/core-properties"/>
-    <ds:schemaRef ds:uri="http://purl.org/dc/elements/1.1/"/>
-    <ds:schemaRef ds:uri="http://purl.org/dc/terms/"/>
-    <ds:schemaRef ds:uri="http://schemas.microsoft.com/internal/obd"/>
+    <ds:schemaRef ds:uri="http://schemas.microsoft.com/sharepoint/v3/contenttype/forms"/>
   </ds:schemaRefs>
 </ds:datastoreItem>
 </file>
@@ -16981,9 +16971,19 @@
 </file>
 
 <file path=customXml/itemProps3.xml><?xml version="1.0" encoding="utf-8"?>
-<ds:datastoreItem xmlns:ds="http://schemas.openxmlformats.org/officeDocument/2006/customXml" ds:itemID="{3836F65B-1B07-41EE-A0E8-BC6EF3855225}">
+<ds:datastoreItem xmlns:ds="http://schemas.openxmlformats.org/officeDocument/2006/customXml" ds:itemID="{A09BF4D4-EF60-4196-BFC3-9462D607978C}">
   <ds:schemaRefs>
-    <ds:schemaRef ds:uri="http://schemas.microsoft.com/sharepoint/v3/contenttype/forms"/>
+    <ds:schemaRef ds:uri="http://schemas.microsoft.com/office/2006/metadata/contentType"/>
+    <ds:schemaRef ds:uri="http://schemas.microsoft.com/office/2006/metadata/properties/metaAttributes"/>
+    <ds:schemaRef ds:uri="http://www.w3.org/2001/XMLSchema"/>
+    <ds:schemaRef ds:uri="http://schemas.microsoft.com/office/2006/metadata/properties"/>
+    <ds:schemaRef ds:uri="4873beb7-5857-4685-be1f-d57550cc96cc"/>
+    <ds:schemaRef ds:uri="http://schemas.microsoft.com/office/2006/documentManagement/types"/>
+    <ds:schemaRef ds:uri="http://schemas.microsoft.com/office/infopath/2007/PartnerControls"/>
+    <ds:schemaRef ds:uri="http://schemas.openxmlformats.org/package/2006/metadata/core-properties"/>
+    <ds:schemaRef ds:uri="http://purl.org/dc/elements/1.1/"/>
+    <ds:schemaRef ds:uri="http://purl.org/dc/terms/"/>
+    <ds:schemaRef ds:uri="http://schemas.microsoft.com/internal/obd"/>
   </ds:schemaRefs>
 </ds:datastoreItem>
 </file>
</xml_diff>